<commit_message>
Update check valid grade method
Check the user's double input
more thoroughly
</commit_message>
<xml_diff>
--- a/ĐỀ 01.pptx
+++ b/ĐỀ 01.pptx
@@ -5,10 +5,10 @@
     <p:sldMasterId id="2147483650" r:id="rId4"/>
   </p:sldMasterIdLst>
   <p:notesMasterIdLst>
-    <p:notesMasterId r:id="rId32"/>
+    <p:notesMasterId r:id="rId33"/>
   </p:notesMasterIdLst>
   <p:handoutMasterIdLst>
-    <p:handoutMasterId r:id="rId33"/>
+    <p:handoutMasterId r:id="rId34"/>
   </p:handoutMasterIdLst>
   <p:sldIdLst>
     <p:sldId id="312" r:id="rId5"/>
@@ -38,6 +38,7 @@
     <p:sldId id="333" r:id="rId29"/>
     <p:sldId id="341" r:id="rId30"/>
     <p:sldId id="343" r:id="rId31"/>
+    <p:sldId id="344" r:id="rId32"/>
   </p:sldIdLst>
   <p:sldSz cx="12192000" cy="6858000"/>
   <p:notesSz cx="13716000" cy="24384000"/>
@@ -27681,6 +27682,255 @@
 </p:sld>
 </file>
 
+<file path=ppt/slides/slide28.xml><?xml version="1.0" encoding="utf-8"?>
+<p:sld xmlns:a="http://schemas.openxmlformats.org/drawingml/2006/main" xmlns:r="http://schemas.openxmlformats.org/officeDocument/2006/relationships" xmlns:p="http://schemas.openxmlformats.org/presentationml/2006/main">
+  <p:cSld>
+    <p:spTree>
+      <p:nvGrpSpPr>
+        <p:cNvPr id="1" name=""/>
+        <p:cNvGrpSpPr/>
+        <p:nvPr/>
+      </p:nvGrpSpPr>
+      <p:grpSpPr>
+        <a:xfrm>
+          <a:off x="0" y="0"/>
+          <a:ext cx="0" cy="0"/>
+          <a:chOff x="0" y="0"/>
+          <a:chExt cx="0" cy="0"/>
+        </a:xfrm>
+      </p:grpSpPr>
+      <p:sp>
+        <p:nvSpPr>
+          <p:cNvPr id="4" name="Content Placeholder 3">
+            <a:extLst>
+              <a:ext uri="{FF2B5EF4-FFF2-40B4-BE49-F238E27FC236}">
+                <a16:creationId xmlns:a16="http://schemas.microsoft.com/office/drawing/2014/main" id="{7CBC0070-826F-4B5C-82AD-84B5C22D4833}"/>
+              </a:ext>
+            </a:extLst>
+          </p:cNvPr>
+          <p:cNvSpPr>
+            <a:spLocks noGrp="1"/>
+          </p:cNvSpPr>
+          <p:nvPr>
+            <p:ph sz="half" idx="1"/>
+          </p:nvPr>
+        </p:nvSpPr>
+        <p:spPr>
+          <a:xfrm>
+            <a:off x="1479176" y="1479177"/>
+            <a:ext cx="9371165" cy="4574432"/>
+          </a:xfrm>
+        </p:spPr>
+        <p:txBody>
+          <a:bodyPr/>
+          <a:lstStyle/>
+          <a:p>
+            <a:pPr>
+              <a:lnSpc>
+                <a:spcPct val="150000"/>
+              </a:lnSpc>
+            </a:pPr>
+            <a:r>
+              <a:rPr lang="en-US" b="1" dirty="0">
+                <a:solidFill>
+                  <a:schemeClr val="accent6">
+                    <a:lumMod val="60000"/>
+                    <a:lumOff val="40000"/>
+                  </a:schemeClr>
+                </a:solidFill>
+              </a:rPr>
+              <a:t>DESIGN</a:t>
+            </a:r>
+            <a:r>
+              <a:rPr lang="en-US" b="1" dirty="0"/>
+              <a:t> : LƯƠNG CHÍ DŨNG</a:t>
+            </a:r>
+          </a:p>
+          <a:p>
+            <a:pPr>
+              <a:lnSpc>
+                <a:spcPct val="150000"/>
+              </a:lnSpc>
+            </a:pPr>
+            <a:r>
+              <a:rPr lang="en-US" b="1" dirty="0">
+                <a:solidFill>
+                  <a:schemeClr val="accent6">
+                    <a:lumMod val="60000"/>
+                    <a:lumOff val="40000"/>
+                  </a:schemeClr>
+                </a:solidFill>
+              </a:rPr>
+              <a:t>TEST</a:t>
+            </a:r>
+            <a:r>
+              <a:rPr lang="en-US" b="1" dirty="0"/>
+              <a:t> : LƯƠNG CHÍ DŨNG</a:t>
+            </a:r>
+          </a:p>
+          <a:p>
+            <a:pPr>
+              <a:lnSpc>
+                <a:spcPct val="150000"/>
+              </a:lnSpc>
+            </a:pPr>
+            <a:r>
+              <a:rPr lang="en-US" b="1" dirty="0">
+                <a:solidFill>
+                  <a:schemeClr val="accent6">
+                    <a:lumMod val="60000"/>
+                    <a:lumOff val="40000"/>
+                  </a:schemeClr>
+                </a:solidFill>
+              </a:rPr>
+              <a:t>SLIDE DEMO </a:t>
+            </a:r>
+            <a:r>
+              <a:rPr lang="en-US" b="1" dirty="0"/>
+              <a:t>: LƯƠNG CHÍ DŨNG</a:t>
+            </a:r>
+          </a:p>
+          <a:p>
+            <a:pPr>
+              <a:lnSpc>
+                <a:spcPct val="150000"/>
+              </a:lnSpc>
+            </a:pPr>
+            <a:r>
+              <a:rPr lang="en-US" b="1" dirty="0">
+                <a:solidFill>
+                  <a:schemeClr val="accent6">
+                    <a:lumMod val="60000"/>
+                    <a:lumOff val="40000"/>
+                  </a:schemeClr>
+                </a:solidFill>
+              </a:rPr>
+              <a:t>PHÁT TRIỂN MENU </a:t>
+            </a:r>
+            <a:r>
+              <a:rPr lang="en-US" b="1" dirty="0"/>
+              <a:t>: LƯƠNG CHÍ DŨNG</a:t>
+            </a:r>
+          </a:p>
+          <a:p>
+            <a:pPr>
+              <a:lnSpc>
+                <a:spcPct val="150000"/>
+              </a:lnSpc>
+            </a:pPr>
+            <a:r>
+              <a:rPr lang="en-US" b="1" dirty="0">
+                <a:solidFill>
+                  <a:schemeClr val="accent6">
+                    <a:lumMod val="60000"/>
+                    <a:lumOff val="40000"/>
+                  </a:schemeClr>
+                </a:solidFill>
+              </a:rPr>
+              <a:t>XÂY DỰNG CLASS </a:t>
+            </a:r>
+            <a:r>
+              <a:rPr lang="en-US" b="1" dirty="0"/>
+              <a:t>: LƯƠNG CHÍ DŨNG</a:t>
+            </a:r>
+          </a:p>
+          <a:p>
+            <a:pPr>
+              <a:lnSpc>
+                <a:spcPct val="150000"/>
+              </a:lnSpc>
+            </a:pPr>
+            <a:r>
+              <a:rPr lang="en-US" b="1" dirty="0">
+                <a:solidFill>
+                  <a:schemeClr val="accent6">
+                    <a:lumMod val="60000"/>
+                    <a:lumOff val="40000"/>
+                  </a:schemeClr>
+                </a:solidFill>
+              </a:rPr>
+              <a:t>XÂY DỰNG CÁC CHỨC NĂNG </a:t>
+            </a:r>
+            <a:r>
+              <a:rPr lang="en-US" b="1" dirty="0"/>
+              <a:t>: LƯƠNG CHÍ DŨNG</a:t>
+            </a:r>
+          </a:p>
+          <a:p>
+            <a:pPr>
+              <a:lnSpc>
+                <a:spcPct val="150000"/>
+              </a:lnSpc>
+            </a:pPr>
+            <a:r>
+              <a:rPr lang="en-US" b="1" dirty="0">
+                <a:solidFill>
+                  <a:schemeClr val="accent6">
+                    <a:lumMod val="60000"/>
+                    <a:lumOff val="40000"/>
+                  </a:schemeClr>
+                </a:solidFill>
+              </a:rPr>
+              <a:t>XÂY DỰNG CÁC HÀM CHUẨN HÓA, CHECK VALID </a:t>
+            </a:r>
+            <a:r>
+              <a:rPr lang="en-US" b="1" dirty="0"/>
+              <a:t>: LƯƠNG CHÍ DŨNG</a:t>
+            </a:r>
+          </a:p>
+          <a:p>
+            <a:pPr>
+              <a:lnSpc>
+                <a:spcPct val="150000"/>
+              </a:lnSpc>
+            </a:pPr>
+            <a:endParaRPr lang="en-US" b="1" dirty="0"/>
+          </a:p>
+        </p:txBody>
+      </p:sp>
+      <p:sp>
+        <p:nvSpPr>
+          <p:cNvPr id="5" name="Slide Number Placeholder 4">
+            <a:extLst>
+              <a:ext uri="{FF2B5EF4-FFF2-40B4-BE49-F238E27FC236}">
+                <a16:creationId xmlns:a16="http://schemas.microsoft.com/office/drawing/2014/main" id="{6D01CD0A-5DD5-40FA-897A-448080DF7A5A}"/>
+              </a:ext>
+            </a:extLst>
+          </p:cNvPr>
+          <p:cNvSpPr>
+            <a:spLocks noGrp="1"/>
+          </p:cNvSpPr>
+          <p:nvPr>
+            <p:ph type="sldNum" sz="quarter" idx="10"/>
+          </p:nvPr>
+        </p:nvSpPr>
+        <p:spPr/>
+        <p:txBody>
+          <a:bodyPr/>
+          <a:lstStyle/>
+          <a:p>
+            <a:fld id="{48F63A3B-78C7-47BE-AE5E-E10140E04643}" type="slidenum">
+              <a:rPr lang="en-US" smtClean="0"/>
+              <a:pPr/>
+              <a:t>28</a:t>
+            </a:fld>
+            <a:endParaRPr lang="en-US" dirty="0"/>
+          </a:p>
+        </p:txBody>
+      </p:sp>
+    </p:spTree>
+    <p:extLst>
+      <p:ext uri="{BB962C8B-B14F-4D97-AF65-F5344CB8AC3E}">
+        <p14:creationId xmlns:p14="http://schemas.microsoft.com/office/powerpoint/2010/main" val="4162566045"/>
+      </p:ext>
+    </p:extLst>
+  </p:cSld>
+  <p:clrMapOvr>
+    <a:masterClrMapping/>
+  </p:clrMapOvr>
+</p:sld>
+</file>
+
 <file path=ppt/slides/slide3.xml><?xml version="1.0" encoding="utf-8"?>
 <p:sld xmlns:a="http://schemas.openxmlformats.org/drawingml/2006/main" xmlns:r="http://schemas.openxmlformats.org/officeDocument/2006/relationships" xmlns:p="http://schemas.openxmlformats.org/presentationml/2006/main">
   <p:cSld>
@@ -29372,6 +29622,15 @@
 </file>
 
 <file path=customXml/item1.xml><?xml version="1.0" encoding="utf-8"?>
+<?mso-contentType ?>
+<FormTemplates xmlns="http://schemas.microsoft.com/sharepoint/v3/contenttype/forms">
+  <Display>DocumentLibraryForm</Display>
+  <Edit>DocumentLibraryForm</Edit>
+  <New>DocumentLibraryForm</New>
+</FormTemplates>
+</file>
+
+<file path=customXml/item2.xml><?xml version="1.0" encoding="utf-8"?>
 <p:properties xmlns:p="http://schemas.microsoft.com/office/2006/metadata/properties" xmlns:xsi="http://www.w3.org/2001/XMLSchema-instance" xmlns:pc="http://schemas.microsoft.com/office/infopath/2007/PartnerControls">
   <documentManagement>
     <_ip_UnifiedCompliancePolicyUIAction xmlns="http://schemas.microsoft.com/sharepoint/v3" xsi:nil="true"/>
@@ -29389,15 +29648,6 @@
     <MediaServiceKeyPoints xmlns="71af3243-3dd4-4a8d-8c0d-dd76da1f02a5" xsi:nil="true"/>
   </documentManagement>
 </p:properties>
-</file>
-
-<file path=customXml/item2.xml><?xml version="1.0" encoding="utf-8"?>
-<?mso-contentType ?>
-<FormTemplates xmlns="http://schemas.microsoft.com/sharepoint/v3/contenttype/forms">
-  <Display>DocumentLibraryForm</Display>
-  <Edit>DocumentLibraryForm</Edit>
-  <New>DocumentLibraryForm</New>
-</FormTemplates>
 </file>
 
 <file path=customXml/item3.xml><?xml version="1.0" encoding="utf-8"?>
@@ -29713,6 +29963,14 @@
 </file>
 
 <file path=customXml/itemProps1.xml><?xml version="1.0" encoding="utf-8"?>
+<ds:datastoreItem xmlns:ds="http://schemas.openxmlformats.org/officeDocument/2006/customXml" ds:itemID="{16DBB56F-4362-4386-A1A1-3DF898896616}">
+  <ds:schemaRefs>
+    <ds:schemaRef ds:uri="http://schemas.microsoft.com/sharepoint/v3/contenttype/forms"/>
+  </ds:schemaRefs>
+</ds:datastoreItem>
+</file>
+
+<file path=customXml/itemProps2.xml><?xml version="1.0" encoding="utf-8"?>
 <ds:datastoreItem xmlns:ds="http://schemas.openxmlformats.org/officeDocument/2006/customXml" ds:itemID="{BA719FA4-954C-4FA8-82CB-206659C3B826}">
   <ds:schemaRefs>
     <ds:schemaRef ds:uri="http://schemas.microsoft.com/office/2006/metadata/properties"/>
@@ -29720,14 +29978,6 @@
     <ds:schemaRef ds:uri="http://schemas.microsoft.com/sharepoint/v3"/>
     <ds:schemaRef ds:uri="71af3243-3dd4-4a8d-8c0d-dd76da1f02a5"/>
     <ds:schemaRef ds:uri="230e9df3-be65-4c73-a93b-d1236ebd677e"/>
-  </ds:schemaRefs>
-</ds:datastoreItem>
-</file>
-
-<file path=customXml/itemProps2.xml><?xml version="1.0" encoding="utf-8"?>
-<ds:datastoreItem xmlns:ds="http://schemas.openxmlformats.org/officeDocument/2006/customXml" ds:itemID="{16DBB56F-4362-4386-A1A1-3DF898896616}">
-  <ds:schemaRefs>
-    <ds:schemaRef ds:uri="http://schemas.microsoft.com/sharepoint/v3/contenttype/forms"/>
   </ds:schemaRefs>
 </ds:datastoreItem>
 </file>

</xml_diff>